<commit_message>
deleted zobel added question slide added a few lines to the text
</commit_message>
<xml_diff>
--- a/Presentation II/Presentation.pptx
+++ b/Presentation II/Presentation.pptx
@@ -9,7 +9,7 @@
     <p:sldId id="257" r:id="rId3"/>
     <p:sldId id="275" r:id="rId4"/>
     <p:sldId id="258" r:id="rId5"/>
-    <p:sldId id="276" r:id="rId6"/>
+    <p:sldId id="274" r:id="rId6"/>
   </p:sldIdLst>
   <p:sldSz cx="9144000" cy="6858000" type="screen4x3"/>
   <p:notesSz cx="6858000" cy="9144000"/>
@@ -4670,6 +4670,42 @@
           </a:p>
         </p:txBody>
       </p:sp>
+      <p:pic>
+        <p:nvPicPr>
+          <p:cNvPr id="4" name="Afbeelding 4">
+            <a:extLst>
+              <a:ext uri="{FF2B5EF4-FFF2-40B4-BE49-F238E27FC236}">
+                <a16:creationId xmlns:a16="http://schemas.microsoft.com/office/drawing/2014/main" id="{DD779826-4F30-7549-899B-A2AD03FE80F3}"/>
+              </a:ext>
+            </a:extLst>
+          </p:cNvPr>
+          <p:cNvPicPr>
+            <a:picLocks noChangeAspect="1"/>
+          </p:cNvPicPr>
+          <p:nvPr/>
+        </p:nvPicPr>
+        <p:blipFill>
+          <a:blip r:embed="rId2">
+            <a:extLst>
+              <a:ext uri="{28A0092B-C50C-407E-A947-70E740481C1C}">
+                <a14:useLocalDpi xmlns:a14="http://schemas.microsoft.com/office/drawing/2010/main" val="0"/>
+              </a:ext>
+            </a:extLst>
+          </a:blip>
+          <a:stretch>
+            <a:fillRect/>
+          </a:stretch>
+        </p:blipFill>
+        <p:spPr>
+          <a:xfrm>
+            <a:off x="4788024" y="3438404"/>
+            <a:ext cx="3749936" cy="2736304"/>
+          </a:xfrm>
+          <a:prstGeom prst="rect">
+            <a:avLst/>
+          </a:prstGeom>
+        </p:spPr>
+      </p:pic>
     </p:spTree>
     <p:extLst>
       <p:ext uri="{BB962C8B-B14F-4D97-AF65-F5344CB8AC3E}">
@@ -4797,6 +4833,53 @@
           </a:p>
         </p:txBody>
       </p:sp>
+      <p:pic>
+        <p:nvPicPr>
+          <p:cNvPr id="4" name="Picture 2" descr="Symbolab - Math solver - Apps on Google Play">
+            <a:extLst>
+              <a:ext uri="{FF2B5EF4-FFF2-40B4-BE49-F238E27FC236}">
+                <a16:creationId xmlns:a16="http://schemas.microsoft.com/office/drawing/2014/main" id="{8C9C3671-8165-8B46-914B-A581FA6E5B72}"/>
+              </a:ext>
+            </a:extLst>
+          </p:cNvPr>
+          <p:cNvPicPr>
+            <a:picLocks noChangeAspect="1" noChangeArrowheads="1"/>
+          </p:cNvPicPr>
+          <p:nvPr/>
+        </p:nvPicPr>
+        <p:blipFill>
+          <a:blip r:embed="rId2" cstate="print">
+            <a:extLst>
+              <a:ext uri="{28A0092B-C50C-407E-A947-70E740481C1C}">
+                <a14:useLocalDpi xmlns:a14="http://schemas.microsoft.com/office/drawing/2010/main" val="0"/>
+              </a:ext>
+            </a:extLst>
+          </a:blip>
+          <a:srcRect/>
+          <a:stretch>
+            <a:fillRect/>
+          </a:stretch>
+        </p:blipFill>
+        <p:spPr bwMode="auto">
+          <a:xfrm>
+            <a:off x="5436096" y="3787561"/>
+            <a:ext cx="1589111" cy="1589111"/>
+          </a:xfrm>
+          <a:prstGeom prst="rect">
+            <a:avLst/>
+          </a:prstGeom>
+          <a:noFill/>
+          <a:extLst>
+            <a:ext uri="{909E8E84-426E-40DD-AFC4-6F175D3DCCD1}">
+              <a14:hiddenFill xmlns:a14="http://schemas.microsoft.com/office/drawing/2010/main">
+                <a:solidFill>
+                  <a:srgbClr val="FFFFFF"/>
+                </a:solidFill>
+              </a14:hiddenFill>
+            </a:ext>
+          </a:extLst>
+        </p:spPr>
+      </p:pic>
     </p:spTree>
     <p:extLst>
       <p:ext uri="{BB962C8B-B14F-4D97-AF65-F5344CB8AC3E}">
@@ -4926,6 +5009,130 @@
           </a:p>
         </p:txBody>
       </p:sp>
+      <p:pic>
+        <p:nvPicPr>
+          <p:cNvPr id="4" name="Picture 5">
+            <a:extLst>
+              <a:ext uri="{FF2B5EF4-FFF2-40B4-BE49-F238E27FC236}">
+                <a16:creationId xmlns:a16="http://schemas.microsoft.com/office/drawing/2014/main" id="{A236F2FE-8D7C-4945-881F-AA3EDAB613F9}"/>
+              </a:ext>
+            </a:extLst>
+          </p:cNvPr>
+          <p:cNvPicPr>
+            <a:picLocks noChangeAspect="1" noChangeArrowheads="1"/>
+          </p:cNvPicPr>
+          <p:nvPr/>
+        </p:nvPicPr>
+        <p:blipFill>
+          <a:blip r:embed="rId2" cstate="print">
+            <a:extLst>
+              <a:ext uri="{28A0092B-C50C-407E-A947-70E740481C1C}">
+                <a14:useLocalDpi xmlns:a14="http://schemas.microsoft.com/office/drawing/2010/main" val="0"/>
+              </a:ext>
+            </a:extLst>
+          </a:blip>
+          <a:srcRect/>
+          <a:stretch>
+            <a:fillRect/>
+          </a:stretch>
+        </p:blipFill>
+        <p:spPr bwMode="auto">
+          <a:xfrm>
+            <a:off x="6228184" y="1417638"/>
+            <a:ext cx="2458616" cy="891609"/>
+          </a:xfrm>
+          <a:prstGeom prst="rect">
+            <a:avLst/>
+          </a:prstGeom>
+          <a:noFill/>
+          <a:ln>
+            <a:noFill/>
+          </a:ln>
+          <a:effectLst/>
+          <a:extLst>
+            <a:ext uri="{909E8E84-426E-40DD-AFC4-6F175D3DCCD1}">
+              <a14:hiddenFill xmlns:a14="http://schemas.microsoft.com/office/drawing/2010/main">
+                <a:solidFill>
+                  <a:schemeClr val="accent1"/>
+                </a:solidFill>
+              </a14:hiddenFill>
+            </a:ext>
+            <a:ext uri="{91240B29-F687-4F45-9708-019B960494DF}">
+              <a14:hiddenLine xmlns:a14="http://schemas.microsoft.com/office/drawing/2010/main" w="9525">
+                <a:solidFill>
+                  <a:schemeClr val="tx1"/>
+                </a:solidFill>
+                <a:miter lim="800000"/>
+                <a:headEnd/>
+                <a:tailEnd/>
+              </a14:hiddenLine>
+            </a:ext>
+            <a:ext uri="{AF507438-7753-43E0-B8FC-AC1667EBCBE1}">
+              <a14:hiddenEffects xmlns:a14="http://schemas.microsoft.com/office/drawing/2010/main">
+                <a:effectLst>
+                  <a:outerShdw dist="35921" dir="2700000" algn="ctr" rotWithShape="0">
+                    <a:schemeClr val="bg2"/>
+                  </a:outerShdw>
+                </a:effectLst>
+              </a14:hiddenEffects>
+            </a:ext>
+          </a:extLst>
+        </p:spPr>
+      </p:pic>
+      <p:pic>
+        <p:nvPicPr>
+          <p:cNvPr id="5" name="Picture 4" descr="Venn diagram proportional and color shading with semi-transparency - Stack  Overflow">
+            <a:extLst>
+              <a:ext uri="{FF2B5EF4-FFF2-40B4-BE49-F238E27FC236}">
+                <a16:creationId xmlns:a16="http://schemas.microsoft.com/office/drawing/2014/main" id="{6C55DBC8-2446-0443-BD31-D59B8CAA81F7}"/>
+              </a:ext>
+            </a:extLst>
+          </p:cNvPr>
+          <p:cNvPicPr>
+            <a:picLocks noChangeAspect="1" noChangeArrowheads="1"/>
+          </p:cNvPicPr>
+          <p:nvPr/>
+        </p:nvPicPr>
+        <p:blipFill rotWithShape="1">
+          <a:blip r:embed="rId3" cstate="print">
+            <a:extLst>
+              <a:ext uri="{BEBA8EAE-BF5A-486C-A8C5-ECC9F3942E4B}">
+                <a14:imgProps xmlns:a14="http://schemas.microsoft.com/office/drawing/2010/main">
+                  <a14:imgLayer r:embed="rId4">
+                    <a14:imgEffect>
+                      <a14:backgroundRemoval t="0" b="100000" l="0" r="100000"/>
+                    </a14:imgEffect>
+                  </a14:imgLayer>
+                </a14:imgProps>
+              </a:ext>
+              <a:ext uri="{28A0092B-C50C-407E-A947-70E740481C1C}">
+                <a14:useLocalDpi xmlns:a14="http://schemas.microsoft.com/office/drawing/2010/main" val="0"/>
+              </a:ext>
+            </a:extLst>
+          </a:blip>
+          <a:srcRect t="10081" b="10204"/>
+          <a:stretch/>
+        </p:blipFill>
+        <p:spPr bwMode="auto">
+          <a:xfrm>
+            <a:off x="6228184" y="2780928"/>
+            <a:ext cx="1944216" cy="1549818"/>
+          </a:xfrm>
+          <a:prstGeom prst="rect">
+            <a:avLst/>
+          </a:prstGeom>
+          <a:noFill/>
+          <a:extLst>
+            <a:ext uri="{909E8E84-426E-40DD-AFC4-6F175D3DCCD1}">
+              <a14:hiddenFill xmlns:a14="http://schemas.microsoft.com/office/drawing/2010/main">
+                <a:solidFill>
+                  <a:srgbClr val="FFFFFF"/>
+                </a:solidFill>
+              </a14:hiddenFill>
+            </a:ext>
+          </a:extLst>
+        </p:spPr>
+      </p:pic>
     </p:spTree>
     <p:extLst>
       <p:ext uri="{BB962C8B-B14F-4D97-AF65-F5344CB8AC3E}">
@@ -4958,83 +5165,113 @@
       </p:grpSpPr>
       <p:sp>
         <p:nvSpPr>
-          <p:cNvPr id="2" name="Tijdelijke aanduiding voor inhoud 1"/>
-          <p:cNvSpPr>
-            <a:spLocks noGrp="1"/>
-          </p:cNvSpPr>
-          <p:nvPr>
-            <p:ph idx="1"/>
-          </p:nvPr>
-        </p:nvSpPr>
-        <p:spPr/>
-        <p:txBody>
-          <a:bodyPr/>
-          <a:lstStyle/>
-          <a:p>
-            <a:r>
-              <a:rPr lang="nl-BE" dirty="0"/>
-              <a:t>Observatie</a:t>
-            </a:r>
-          </a:p>
-          <a:p>
-            <a:r>
-              <a:rPr lang="nl-BE" dirty="0"/>
-              <a:t>Vraag</a:t>
-            </a:r>
-          </a:p>
-          <a:p>
-            <a:r>
-              <a:rPr lang="nl-BE" dirty="0"/>
-              <a:t>Waarom</a:t>
-            </a:r>
-          </a:p>
-          <a:p>
-            <a:r>
-              <a:rPr lang="nl-BE" dirty="0"/>
-              <a:t>Hypothese</a:t>
-            </a:r>
-          </a:p>
-          <a:p>
-            <a:r>
-              <a:rPr lang="nl-BE" dirty="0"/>
-              <a:t>Evidence</a:t>
-            </a:r>
-          </a:p>
-          <a:p>
-            <a:r>
-              <a:rPr lang="nl-BE"/>
-              <a:t>Vereisten</a:t>
+          <p:cNvPr id="4" name="AutoShape 2" descr="Pietro.png"/>
+          <p:cNvSpPr>
+            <a:spLocks noChangeAspect="1" noChangeArrowheads="1"/>
+          </p:cNvSpPr>
+          <p:nvPr/>
+        </p:nvSpPr>
+        <p:spPr bwMode="auto">
+          <a:xfrm>
+            <a:off x="155575" y="-144463"/>
+            <a:ext cx="304800" cy="304801"/>
+          </a:xfrm>
+          <a:prstGeom prst="rect">
+            <a:avLst/>
+          </a:prstGeom>
+          <a:noFill/>
+          <a:extLst>
+            <a:ext uri="{909E8E84-426E-40DD-AFC4-6F175D3DCCD1}">
+              <a14:hiddenFill xmlns:a14="http://schemas.microsoft.com/office/drawing/2010/main">
+                <a:solidFill>
+                  <a:srgbClr val="FFFFFF"/>
+                </a:solidFill>
+              </a14:hiddenFill>
+            </a:ext>
+          </a:extLst>
+        </p:spPr>
+        <p:txBody>
+          <a:bodyPr vert="horz" wrap="square" lIns="91440" tIns="45720" rIns="91440" bIns="45720" numCol="1" anchor="t" anchorCtr="0" compatLnSpc="1">
+            <a:prstTxWarp prst="textNoShape">
+              <a:avLst/>
+            </a:prstTxWarp>
+          </a:bodyPr>
+          <a:lstStyle/>
+          <a:p>
+            <a:endParaRPr lang="nl-BE"/>
+          </a:p>
+        </p:txBody>
+      </p:sp>
+      <p:sp>
+        <p:nvSpPr>
+          <p:cNvPr id="11" name="Titel 1"/>
+          <p:cNvSpPr txBox="1">
+            <a:spLocks/>
+          </p:cNvSpPr>
+          <p:nvPr/>
+        </p:nvSpPr>
+        <p:spPr>
+          <a:xfrm>
+            <a:off x="685800" y="2391327"/>
+            <a:ext cx="7772400" cy="1829761"/>
+          </a:xfrm>
+          <a:prstGeom prst="rect">
+            <a:avLst/>
+          </a:prstGeom>
+        </p:spPr>
+        <p:txBody>
+          <a:bodyPr vert="horz" rtlCol="0" anchor="ctr">
+            <a:normAutofit fontScale="97500"/>
+            <a:scene3d>
+              <a:camera prst="orthographicFront"/>
+              <a:lightRig rig="soft" dir="t"/>
+            </a:scene3d>
+            <a:sp3d prstMaterial="softEdge">
+              <a:bevelT w="25400" h="25400"/>
+            </a:sp3d>
+          </a:bodyPr>
+          <a:lstStyle>
+            <a:lvl1pPr algn="l" rtl="0" eaLnBrk="1" latinLnBrk="0" hangingPunct="1">
+              <a:spcBef>
+                <a:spcPct val="0"/>
+              </a:spcBef>
+              <a:buNone/>
+              <a:defRPr kumimoji="0" sz="4100" b="1" kern="1200">
+                <a:solidFill>
+                  <a:schemeClr val="tx2"/>
+                </a:solidFill>
+                <a:effectLst>
+                  <a:outerShdw blurRad="31750" dist="25400" dir="5400000" algn="tl" rotWithShape="0">
+                    <a:srgbClr val="000000">
+                      <a:alpha val="25000"/>
+                    </a:srgbClr>
+                  </a:outerShdw>
+                </a:effectLst>
+                <a:latin typeface="+mj-lt"/>
+                <a:ea typeface="+mj-ea"/>
+                <a:cs typeface="+mj-cs"/>
+              </a:defRPr>
+            </a:lvl1pPr>
+            <a:extLst/>
+          </a:lstStyle>
+          <a:p>
+            <a:pPr algn="ctr"/>
+            <a:r>
+              <a:rPr lang="en-US" sz="4500" dirty="0" err="1"/>
+              <a:t>Vragen</a:t>
+            </a:r>
+            <a:r>
+              <a:rPr lang="en-US" sz="4500" dirty="0"/>
+              <a:t>?</a:t>
             </a:r>
             <a:endParaRPr lang="nl-BE" dirty="0"/>
-          </a:p>
-        </p:txBody>
-      </p:sp>
-      <p:sp>
-        <p:nvSpPr>
-          <p:cNvPr id="3" name="Titel 2"/>
-          <p:cNvSpPr>
-            <a:spLocks noGrp="1"/>
-          </p:cNvSpPr>
-          <p:nvPr>
-            <p:ph type="title"/>
-          </p:nvPr>
-        </p:nvSpPr>
-        <p:spPr/>
-        <p:txBody>
-          <a:bodyPr/>
-          <a:lstStyle/>
-          <a:p>
-            <a:r>
-              <a:rPr lang="nl-BE" dirty="0"/>
-              <a:t>Zobol</a:t>
-            </a:r>
           </a:p>
         </p:txBody>
       </p:sp>
     </p:spTree>
     <p:extLst>
       <p:ext uri="{BB962C8B-B14F-4D97-AF65-F5344CB8AC3E}">
-        <p14:creationId xmlns:p14="http://schemas.microsoft.com/office/powerpoint/2010/main" val="3301373306"/>
+        <p14:creationId xmlns:p14="http://schemas.microsoft.com/office/powerpoint/2010/main" val="1165768497"/>
       </p:ext>
     </p:extLst>
   </p:cSld>

</xml_diff>